<commit_message>
Refactoring and added tests
</commit_message>
<xml_diff>
--- a/docs/SLE.Language.CNNArch.pptx
+++ b/docs/SLE.Language.CNNArch.pptx
@@ -129,7 +129,7 @@
   </p:defaultTextStyle>
   <p:extLst>
     <p:ext uri="{EFAFB233-063F-42B5-8137-9DF3F51BA10A}">
-      <p15:sldGuideLst xmlns="" xmlns:p15="http://schemas.microsoft.com/office/powerpoint/2012/main">
+      <p15:sldGuideLst xmlns:p15="http://schemas.microsoft.com/office/powerpoint/2012/main" xmlns="">
         <p15:guide id="1" orient="horz" pos="2160">
           <p15:clr>
             <a:srgbClr val="A4A3A4"/>
@@ -143,7 +143,7 @@
       </p15:sldGuideLst>
     </p:ext>
     <p:ext uri="{2D200454-40CA-4A62-9FC3-DE9A4176ACB9}">
-      <p15:notesGuideLst xmlns="" xmlns:p15="http://schemas.microsoft.com/office/powerpoint/2012/main"/>
+      <p15:notesGuideLst xmlns:p15="http://schemas.microsoft.com/office/powerpoint/2012/main" xmlns=""/>
     </p:ext>
   </p:extLst>
 </p:presentation>
@@ -231,7 +231,7 @@
           <a:p>
             <a:fld id="{B397C3DE-5202-43C6-9884-759C309EA47C}" type="datetimeFigureOut">
               <a:rPr lang="de-DE" smtClean="0"/>
-              <a:t>11.04.2018</a:t>
+              <a:t>10.05.2018</a:t>
             </a:fld>
             <a:endParaRPr lang="de-DE"/>
           </a:p>
@@ -397,7 +397,7 @@
             <a:fld id="{579F16DD-693B-4C24-88AC-508F1490D8AD}" type="datetimeFigureOut">
               <a:rPr lang="de-DE" smtClean="0"/>
               <a:pPr/>
-              <a:t>11.04.2018</a:t>
+              <a:t>10.05.2018</a:t>
             </a:fld>
             <a:endParaRPr lang="en-US"/>
           </a:p>
@@ -2686,11 +2686,7 @@
           <a:p>
             <a:r>
               <a:rPr lang="en-US" sz="2000" dirty="0" smtClean="0"/>
-              <a:t>Software </a:t>
-            </a:r>
-            <a:r>
-              <a:rPr lang="en-US" sz="2000" dirty="0" smtClean="0"/>
-              <a:t>Engineering</a:t>
+              <a:t>Software Engineering</a:t>
             </a:r>
             <a:br>
               <a:rPr lang="en-US" sz="2000" dirty="0" smtClean="0"/>
@@ -3155,26 +3151,16 @@
             <a:pPr lvl="1"/>
             <a:r>
               <a:rPr lang="en-US" dirty="0" smtClean="0"/>
-              <a:t>Mostly finished</a:t>
+              <a:t>Complete</a:t>
             </a:r>
           </a:p>
           <a:p>
             <a:pPr lvl="1"/>
             <a:r>
               <a:rPr lang="en-US" dirty="0" smtClean="0"/>
-              <a:t>Next major issue: instances for network parameterization</a:t>
-            </a:r>
-          </a:p>
-          <a:p>
-            <a:pPr lvl="1"/>
-            <a:r>
-              <a:rPr lang="en-US" dirty="0" smtClean="0"/>
-              <a:t>Smaller issues: bug fixes, additional tests, improvements for the generator</a:t>
-            </a:r>
-            <a:endParaRPr lang="en-US" dirty="0"/>
-          </a:p>
-          <a:p>
-            <a:endParaRPr lang="en-US" dirty="0"/>
+              <a:t>Additional tests necessary</a:t>
+            </a:r>
+            <a:endParaRPr lang="en-US" dirty="0" smtClean="0"/>
           </a:p>
         </p:txBody>
       </p:sp>
@@ -3472,11 +3458,7 @@
             </a:r>
             <a:r>
               <a:rPr lang="en-US" dirty="0" smtClean="0"/>
-              <a:t> implemented here:	</a:t>
-            </a:r>
-            <a:r>
-              <a:rPr lang="en-US" dirty="0" smtClean="0"/>
-              <a:t>./</a:t>
+              <a:t> implemented here:	./</a:t>
             </a:r>
             <a:r>
               <a:rPr lang="en-US" dirty="0" err="1" smtClean="0"/>
@@ -3526,7 +3508,6 @@
               <a:rPr lang="en-US" dirty="0" smtClean="0"/>
               <a:t>/</a:t>
             </a:r>
-            <a:endParaRPr lang="en-US" dirty="0" smtClean="0"/>
           </a:p>
           <a:p>
             <a:endParaRPr lang="en-US" dirty="0" smtClean="0"/>
@@ -3763,7 +3744,7 @@
             <a:pPr lvl="1"/>
             <a:r>
               <a:rPr lang="en-US" sz="1600" dirty="0" err="1" smtClean="0"/>
-              <a:t>MethodParameter</a:t>
+              <a:t>LayerParameter</a:t>
             </a:r>
             <a:r>
               <a:rPr lang="en-US" sz="1600" dirty="0" smtClean="0"/>
@@ -3786,8 +3767,8 @@
           <a:p>
             <a:pPr lvl="1"/>
             <a:r>
-              <a:rPr lang="en-US" sz="1600" dirty="0" err="1" smtClean="0"/>
-              <a:t>MethodLayer</a:t>
+              <a:rPr lang="en-US" sz="1600" dirty="0" smtClean="0"/>
+              <a:t>Layer</a:t>
             </a:r>
             <a:r>
               <a:rPr lang="en-US" sz="1600" dirty="0"/>
@@ -3795,7 +3776,7 @@
             </a:r>
             <a:r>
               <a:rPr lang="en-US" sz="1600" dirty="0" err="1" smtClean="0"/>
-              <a:t>IOLayer</a:t>
+              <a:t>IOElement</a:t>
             </a:r>
             <a:r>
               <a:rPr lang="en-US" sz="1600" dirty="0" smtClean="0"/>
@@ -3807,19 +3788,20 @@
             </a:r>
             <a:r>
               <a:rPr lang="en-US" sz="1600" dirty="0" smtClean="0"/>
-              <a:t>                          </a:t>
+              <a:t>, </a:t>
+            </a:r>
+          </a:p>
+          <a:p>
+            <a:pPr marL="457200" lvl="1" indent="0">
+              <a:buNone/>
+            </a:pPr>
+            <a:r>
+              <a:rPr lang="en-US" sz="1600" dirty="0" smtClean="0"/>
+              <a:t>         </a:t>
             </a:r>
             <a:r>
               <a:rPr lang="en-US" sz="1600" dirty="0" err="1" smtClean="0"/>
-              <a:t>LayerKind</a:t>
-            </a:r>
-            <a:endParaRPr lang="en-US" sz="1600" dirty="0" smtClean="0"/>
-          </a:p>
-          <a:p>
-            <a:pPr lvl="1"/>
-            <a:r>
-              <a:rPr lang="en-US" sz="1600" dirty="0" err="1" smtClean="0"/>
-              <a:t>ParallelLayer</a:t>
+              <a:t>ParallelBlock</a:t>
             </a:r>
             <a:r>
               <a:rPr lang="en-US" sz="1600" dirty="0" smtClean="0"/>
@@ -3831,19 +3813,23 @@
             </a:r>
             <a:r>
               <a:rPr lang="en-US" sz="1600" dirty="0" smtClean="0"/>
-              <a:t>                             </a:t>
+              <a:t>                        </a:t>
+            </a:r>
+            <a:r>
+              <a:rPr lang="en-US" sz="1600" dirty="0" smtClean="0"/>
+              <a:t> </a:t>
             </a:r>
             <a:r>
               <a:rPr lang="en-US" sz="1600" dirty="0" err="1" smtClean="0"/>
-              <a:t>LayerKind</a:t>
-            </a:r>
-            <a:endParaRPr lang="en-US" sz="1600" dirty="0" smtClean="0"/>
+              <a:t>ArchitetureElementKind</a:t>
+            </a:r>
+            <a:endParaRPr lang="en-US" sz="1600" dirty="0"/>
           </a:p>
           <a:p>
             <a:pPr lvl="1"/>
             <a:r>
               <a:rPr lang="en-US" sz="1600" dirty="0" err="1" smtClean="0"/>
-              <a:t>MethodDeclaration</a:t>
+              <a:t>LayerDeclaration</a:t>
             </a:r>
             <a:r>
               <a:rPr lang="en-US" sz="1600" dirty="0" smtClean="0"/>
@@ -3851,7 +3837,7 @@
             </a:r>
             <a:r>
               <a:rPr lang="en-US" sz="1600" dirty="0" err="1" smtClean="0"/>
-              <a:t>MethodDeclarationKind</a:t>
+              <a:t>LayerDeclarationKind</a:t>
             </a:r>
             <a:endParaRPr lang="en-US" sz="1600" dirty="0" smtClean="0"/>
           </a:p>
@@ -3922,17 +3908,9 @@
               <a:t>ArchSimpleExpression</a:t>
             </a:r>
             <a:r>
-              <a:rPr lang="en-US" sz="1600" dirty="0" smtClean="0"/>
-              <a:t> 		           </a:t>
-            </a:r>
-            <a:r>
-              <a:rPr lang="en-US" sz="1600" dirty="0" err="1" smtClean="0"/>
-              <a:t>ArchExpressionKind</a:t>
-            </a:r>
-            <a:endParaRPr lang="en-US" sz="1600" dirty="0" smtClean="0"/>
-          </a:p>
-          <a:p>
-            <a:pPr lvl="1"/>
+              <a:rPr lang="en-US" sz="1600" dirty="0"/>
+              <a:t>, </a:t>
+            </a:r>
             <a:r>
               <a:rPr lang="en-US" sz="1600" dirty="0" err="1" smtClean="0"/>
               <a:t>ArchValueRange</a:t>
@@ -3942,8 +3920,29 @@
               <a:t>, </a:t>
             </a:r>
             <a:r>
+              <a:rPr lang="en-US" sz="1600" dirty="0" smtClean="0"/>
+              <a:t>		</a:t>
+            </a:r>
+          </a:p>
+          <a:p>
+            <a:pPr marL="457200" lvl="1" indent="0">
+              <a:buNone/>
+            </a:pPr>
+            <a:r>
+              <a:rPr lang="en-US" sz="1600" dirty="0"/>
+              <a:t> </a:t>
+            </a:r>
+            <a:r>
+              <a:rPr lang="en-US" sz="1600" dirty="0" smtClean="0"/>
+              <a:t>        </a:t>
+            </a:r>
+            <a:r>
               <a:rPr lang="en-US" sz="1600" dirty="0" err="1" smtClean="0"/>
               <a:t>ArchParallelSequence</a:t>
+            </a:r>
+            <a:r>
+              <a:rPr lang="en-US" sz="1600" dirty="0" smtClean="0"/>
+              <a:t>	           </a:t>
             </a:r>
             <a:r>
               <a:rPr lang="en-US" sz="1600" dirty="0" smtClean="0"/>
@@ -4157,25 +4156,45 @@
             <a:pPr lvl="1"/>
             <a:r>
               <a:rPr lang="en-US" sz="1800" dirty="0" smtClean="0"/>
-              <a:t>Layer                                                     arguments + contained layers</a:t>
+              <a:t>Architecture Element                             arguments </a:t>
+            </a:r>
+            <a:r>
+              <a:rPr lang="en-US" sz="1800" dirty="0" smtClean="0"/>
+              <a:t>+ contained </a:t>
+            </a:r>
+            <a:r>
+              <a:rPr lang="en-US" sz="1800" dirty="0" smtClean="0"/>
+              <a:t>layers</a:t>
             </a:r>
           </a:p>
           <a:p>
             <a:pPr lvl="1"/>
             <a:r>
               <a:rPr lang="en-US" sz="1800" dirty="0" err="1" smtClean="0"/>
-              <a:t>MethodDeclaration</a:t>
+              <a:t>LayerDeclaration</a:t>
             </a:r>
             <a:r>
               <a:rPr lang="en-US" sz="1800" dirty="0" smtClean="0"/>
-              <a:t>                                method parameters + body</a:t>
+              <a:t>                                   layer </a:t>
+            </a:r>
+            <a:r>
+              <a:rPr lang="en-US" sz="1800" dirty="0" smtClean="0"/>
+              <a:t>parameters + body</a:t>
             </a:r>
           </a:p>
           <a:p>
             <a:pPr lvl="1"/>
             <a:r>
               <a:rPr lang="en-US" sz="1800" dirty="0" smtClean="0"/>
-              <a:t>Architecture                                           method declarations </a:t>
+              <a:t>Architecture                                           </a:t>
+            </a:r>
+            <a:r>
+              <a:rPr lang="en-US" sz="1800" dirty="0" smtClean="0"/>
+              <a:t>layer </a:t>
+            </a:r>
+            <a:r>
+              <a:rPr lang="en-US" sz="1800" dirty="0" smtClean="0"/>
+              <a:t>declarations </a:t>
             </a:r>
           </a:p>
           <a:p>
@@ -4184,7 +4203,11 @@
             </a:pPr>
             <a:r>
               <a:rPr lang="en-US" sz="1800" dirty="0" smtClean="0"/>
-              <a:t>                                                                       + architecture body</a:t>
+              <a:t>                                                                       + architecture </a:t>
+            </a:r>
+            <a:r>
+              <a:rPr lang="en-US" sz="1800" dirty="0" smtClean="0"/>
+              <a:t>body</a:t>
             </a:r>
           </a:p>
           <a:p>
@@ -4203,12 +4226,24 @@
           <a:p>
             <a:pPr lvl="1"/>
             <a:r>
+              <a:rPr lang="en-US" sz="1800" dirty="0" err="1" smtClean="0"/>
+              <a:t>ArchitectureElement</a:t>
+            </a:r>
+            <a:r>
               <a:rPr lang="en-US" sz="1800" dirty="0" smtClean="0"/>
-              <a:t>Layer means all NTs which create a </a:t>
+              <a:t> </a:t>
+            </a:r>
+            <a:r>
+              <a:rPr lang="en-US" sz="1800" dirty="0" smtClean="0"/>
+              <a:t>means all NTs which create </a:t>
+            </a:r>
+            <a:r>
+              <a:rPr lang="en-US" sz="1800" dirty="0"/>
+              <a:t>an </a:t>
             </a:r>
             <a:r>
               <a:rPr lang="en-US" sz="1800" dirty="0" err="1" smtClean="0"/>
-              <a:t>LayerSymbol</a:t>
+              <a:t>ArchitectureElementSymbol</a:t>
             </a:r>
             <a:endParaRPr lang="en-US" sz="1800" dirty="0" smtClean="0"/>
           </a:p>
@@ -4382,11 +4417,12 @@
           <a:p>
             <a:r>
               <a:rPr lang="en-US" dirty="0" smtClean="0"/>
-              <a:t>See thesis (not yet finished)</a:t>
-            </a:r>
-          </a:p>
-          <a:p>
-            <a:pPr lvl="2"/>
+              <a:t>See </a:t>
+            </a:r>
+            <a:r>
+              <a:rPr lang="en-US" dirty="0" smtClean="0"/>
+              <a:t>thesis: Modeling Languages for Deep Learning based Cyber-Physical Systems</a:t>
+            </a:r>
             <a:endParaRPr lang="en-US" dirty="0"/>
           </a:p>
         </p:txBody>
@@ -4483,15 +4519,13 @@
             <a:pPr lvl="1"/>
             <a:r>
               <a:rPr lang="en-US" dirty="0" smtClean="0"/>
-              <a:t>Further testing and evaluation of SMI and generator</a:t>
-            </a:r>
-          </a:p>
-          <a:p>
-            <a:pPr lvl="1"/>
-            <a:r>
-              <a:rPr lang="en-US" dirty="0" smtClean="0"/>
-              <a:t>Improve network parameterization</a:t>
-            </a:r>
+              <a:t>Further testing and </a:t>
+            </a:r>
+            <a:r>
+              <a:rPr lang="en-US" dirty="0" smtClean="0"/>
+              <a:t>evaluation of the generator</a:t>
+            </a:r>
+            <a:endParaRPr lang="en-US" dirty="0" smtClean="0"/>
           </a:p>
         </p:txBody>
       </p:sp>
@@ -5454,7 +5488,7 @@
   <a:extraClrSchemeLst/>
   <a:extLst>
     <a:ext uri="{05A4C25C-085E-4340-85A3-A5531E510DB2}">
-      <thm15:themeFamily xmlns="" xmlns:thm15="http://schemas.microsoft.com/office/thememl/2012/main" name="Office Theme" id="{62F939B6-93AF-4DB8-9C6B-D6C7DFDC589F}" vid="{4A3C46E8-61CC-4603-A589-7422A47A8E4A}"/>
+      <thm15:themeFamily xmlns:thm15="http://schemas.microsoft.com/office/thememl/2012/main" xmlns="" name="Office Theme" id="{62F939B6-93AF-4DB8-9C6B-D6C7DFDC589F}" vid="{4A3C46E8-61CC-4603-A589-7422A47A8E4A}"/>
     </a:ext>
   </a:extLst>
 </a:theme>

</xml_diff>